<commit_message>
Update Estimated Pose Figure
</commit_message>
<xml_diff>
--- a/docs/SRS/PoseEstimation.pptx
+++ b/docs/SRS/PoseEstimation.pptx
@@ -104,13 +104,18 @@
       </a:defRPr>
     </a:lvl9pPr>
   </p:defaultTextStyle>
+  <p:extLst>
+    <p:ext uri="{EFAFB233-063F-42B5-8137-9DF3F51BA10A}">
+      <p15:sldGuideLst xmlns:p15="http://schemas.microsoft.com/office/powerpoint/2012/main"/>
+    </p:ext>
+  </p:extLst>
 </p:presentation>
 </file>
 
 <file path=ppt/revisionInfo.xml><?xml version="1.0" encoding="utf-8"?>
 <p1510:revInfo xmlns:a="http://schemas.openxmlformats.org/drawingml/2006/main" xmlns:r="http://schemas.openxmlformats.org/officeDocument/2006/relationships" xmlns:p1510="http://schemas.microsoft.com/office/powerpoint/2015/10/main">
   <p1510:revLst>
-    <p1510:client id="{D979DD0A-841E-4B1F-91B8-20E12227810E}" v="116" dt="2025-03-09T20:23:16.362"/>
+    <p1510:client id="{D979DD0A-841E-4B1F-91B8-20E12227810E}" v="119" dt="2025-03-09T20:40:53.670"/>
   </p1510:revLst>
 </p1510:revInfo>
 </file>
@@ -120,12 +125,12 @@
   <pc:docChgLst>
     <pc:chgData name="Aliyah Jimoh" userId="a3c4c2772f0e4691" providerId="LiveId" clId="{D979DD0A-841E-4B1F-91B8-20E12227810E}"/>
     <pc:docChg chg="undo redo custSel modSld">
-      <pc:chgData name="Aliyah Jimoh" userId="a3c4c2772f0e4691" providerId="LiveId" clId="{D979DD0A-841E-4B1F-91B8-20E12227810E}" dt="2025-03-09T20:23:23.644" v="452" actId="1076"/>
+      <pc:chgData name="Aliyah Jimoh" userId="a3c4c2772f0e4691" providerId="LiveId" clId="{D979DD0A-841E-4B1F-91B8-20E12227810E}" dt="2025-03-09T20:41:09.555" v="460" actId="1076"/>
       <pc:docMkLst>
         <pc:docMk/>
       </pc:docMkLst>
       <pc:sldChg chg="addSp delSp modSp mod">
-        <pc:chgData name="Aliyah Jimoh" userId="a3c4c2772f0e4691" providerId="LiveId" clId="{D979DD0A-841E-4B1F-91B8-20E12227810E}" dt="2025-03-09T20:23:23.644" v="452" actId="1076"/>
+        <pc:chgData name="Aliyah Jimoh" userId="a3c4c2772f0e4691" providerId="LiveId" clId="{D979DD0A-841E-4B1F-91B8-20E12227810E}" dt="2025-03-09T20:41:09.555" v="460" actId="1076"/>
         <pc:sldMkLst>
           <pc:docMk/>
           <pc:sldMk cId="1142656066" sldId="256"/>
@@ -163,7 +168,7 @@
           </ac:spMkLst>
         </pc:spChg>
         <pc:spChg chg="add mod">
-          <ac:chgData name="Aliyah Jimoh" userId="a3c4c2772f0e4691" providerId="LiveId" clId="{D979DD0A-841E-4B1F-91B8-20E12227810E}" dt="2025-03-09T20:14:41.351" v="424" actId="164"/>
+          <ac:chgData name="Aliyah Jimoh" userId="a3c4c2772f0e4691" providerId="LiveId" clId="{D979DD0A-841E-4B1F-91B8-20E12227810E}" dt="2025-03-09T20:40:53.670" v="457" actId="113"/>
           <ac:spMkLst>
             <pc:docMk/>
             <pc:sldMk cId="1142656066" sldId="256"/>
@@ -235,7 +240,7 @@
           </ac:spMkLst>
         </pc:spChg>
         <pc:spChg chg="add mod ord">
-          <ac:chgData name="Aliyah Jimoh" userId="a3c4c2772f0e4691" providerId="LiveId" clId="{D979DD0A-841E-4B1F-91B8-20E12227810E}" dt="2025-03-09T20:22:13.341" v="443" actId="165"/>
+          <ac:chgData name="Aliyah Jimoh" userId="a3c4c2772f0e4691" providerId="LiveId" clId="{D979DD0A-841E-4B1F-91B8-20E12227810E}" dt="2025-03-09T20:40:53.670" v="457" actId="113"/>
           <ac:spMkLst>
             <pc:docMk/>
             <pc:sldMk cId="1142656066" sldId="256"/>
@@ -243,7 +248,7 @@
           </ac:spMkLst>
         </pc:spChg>
         <pc:spChg chg="add mod">
-          <ac:chgData name="Aliyah Jimoh" userId="a3c4c2772f0e4691" providerId="LiveId" clId="{D979DD0A-841E-4B1F-91B8-20E12227810E}" dt="2025-03-09T19:52:33.670" v="273" actId="164"/>
+          <ac:chgData name="Aliyah Jimoh" userId="a3c4c2772f0e4691" providerId="LiveId" clId="{D979DD0A-841E-4B1F-91B8-20E12227810E}" dt="2025-03-09T20:40:53.670" v="457" actId="113"/>
           <ac:spMkLst>
             <pc:docMk/>
             <pc:sldMk cId="1142656066" sldId="256"/>
@@ -251,7 +256,7 @@
           </ac:spMkLst>
         </pc:spChg>
         <pc:spChg chg="add mod">
-          <ac:chgData name="Aliyah Jimoh" userId="a3c4c2772f0e4691" providerId="LiveId" clId="{D979DD0A-841E-4B1F-91B8-20E12227810E}" dt="2025-03-09T20:22:28.204" v="446" actId="1076"/>
+          <ac:chgData name="Aliyah Jimoh" userId="a3c4c2772f0e4691" providerId="LiveId" clId="{D979DD0A-841E-4B1F-91B8-20E12227810E}" dt="2025-03-09T20:40:41.009" v="454" actId="113"/>
           <ac:spMkLst>
             <pc:docMk/>
             <pc:sldMk cId="1142656066" sldId="256"/>
@@ -267,7 +272,7 @@
           </ac:spMkLst>
         </pc:spChg>
         <pc:spChg chg="add mod">
-          <ac:chgData name="Aliyah Jimoh" userId="a3c4c2772f0e4691" providerId="LiveId" clId="{D979DD0A-841E-4B1F-91B8-20E12227810E}" dt="2025-03-09T20:14:41.351" v="424" actId="164"/>
+          <ac:chgData name="Aliyah Jimoh" userId="a3c4c2772f0e4691" providerId="LiveId" clId="{D979DD0A-841E-4B1F-91B8-20E12227810E}" dt="2025-03-09T20:40:53.670" v="457" actId="113"/>
           <ac:spMkLst>
             <pc:docMk/>
             <pc:sldMk cId="1142656066" sldId="256"/>
@@ -283,7 +288,7 @@
           </ac:spMkLst>
         </pc:spChg>
         <pc:spChg chg="add mod">
-          <ac:chgData name="Aliyah Jimoh" userId="a3c4c2772f0e4691" providerId="LiveId" clId="{D979DD0A-841E-4B1F-91B8-20E12227810E}" dt="2025-03-09T20:22:58.899" v="450" actId="1076"/>
+          <ac:chgData name="Aliyah Jimoh" userId="a3c4c2772f0e4691" providerId="LiveId" clId="{D979DD0A-841E-4B1F-91B8-20E12227810E}" dt="2025-03-09T20:41:09.555" v="460" actId="1076"/>
           <ac:spMkLst>
             <pc:docMk/>
             <pc:sldMk cId="1142656066" sldId="256"/>
@@ -299,7 +304,7 @@
           </ac:spMkLst>
         </pc:spChg>
         <pc:spChg chg="add mod">
-          <ac:chgData name="Aliyah Jimoh" userId="a3c4c2772f0e4691" providerId="LiveId" clId="{D979DD0A-841E-4B1F-91B8-20E12227810E}" dt="2025-03-09T20:22:13.341" v="443" actId="165"/>
+          <ac:chgData name="Aliyah Jimoh" userId="a3c4c2772f0e4691" providerId="LiveId" clId="{D979DD0A-841E-4B1F-91B8-20E12227810E}" dt="2025-03-09T20:40:53.670" v="457" actId="113"/>
           <ac:spMkLst>
             <pc:docMk/>
             <pc:sldMk cId="1142656066" sldId="256"/>
@@ -323,7 +328,7 @@
           </ac:spMkLst>
         </pc:spChg>
         <pc:spChg chg="add mod">
-          <ac:chgData name="Aliyah Jimoh" userId="a3c4c2772f0e4691" providerId="LiveId" clId="{D979DD0A-841E-4B1F-91B8-20E12227810E}" dt="2025-03-09T20:22:13.341" v="443" actId="165"/>
+          <ac:chgData name="Aliyah Jimoh" userId="a3c4c2772f0e4691" providerId="LiveId" clId="{D979DD0A-841E-4B1F-91B8-20E12227810E}" dt="2025-03-09T20:40:53.670" v="457" actId="113"/>
           <ac:spMkLst>
             <pc:docMk/>
             <pc:sldMk cId="1142656066" sldId="256"/>
@@ -347,7 +352,7 @@
           </ac:spMkLst>
         </pc:spChg>
         <pc:spChg chg="add mod">
-          <ac:chgData name="Aliyah Jimoh" userId="a3c4c2772f0e4691" providerId="LiveId" clId="{D979DD0A-841E-4B1F-91B8-20E12227810E}" dt="2025-03-09T20:22:13.341" v="443" actId="165"/>
+          <ac:chgData name="Aliyah Jimoh" userId="a3c4c2772f0e4691" providerId="LiveId" clId="{D979DD0A-841E-4B1F-91B8-20E12227810E}" dt="2025-03-09T20:40:53.670" v="457" actId="113"/>
           <ac:spMkLst>
             <pc:docMk/>
             <pc:sldMk cId="1142656066" sldId="256"/>
@@ -355,7 +360,7 @@
           </ac:spMkLst>
         </pc:spChg>
         <pc:spChg chg="add mod">
-          <ac:chgData name="Aliyah Jimoh" userId="a3c4c2772f0e4691" providerId="LiveId" clId="{D979DD0A-841E-4B1F-91B8-20E12227810E}" dt="2025-03-09T20:22:13.341" v="443" actId="165"/>
+          <ac:chgData name="Aliyah Jimoh" userId="a3c4c2772f0e4691" providerId="LiveId" clId="{D979DD0A-841E-4B1F-91B8-20E12227810E}" dt="2025-03-09T20:40:53.670" v="457" actId="113"/>
           <ac:spMkLst>
             <pc:docMk/>
             <pc:sldMk cId="1142656066" sldId="256"/>
@@ -363,7 +368,7 @@
           </ac:spMkLst>
         </pc:spChg>
         <pc:spChg chg="add mod ord topLvl">
-          <ac:chgData name="Aliyah Jimoh" userId="a3c4c2772f0e4691" providerId="LiveId" clId="{D979DD0A-841E-4B1F-91B8-20E12227810E}" dt="2025-03-09T20:23:16.354" v="451" actId="164"/>
+          <ac:chgData name="Aliyah Jimoh" userId="a3c4c2772f0e4691" providerId="LiveId" clId="{D979DD0A-841E-4B1F-91B8-20E12227810E}" dt="2025-03-09T20:41:03.853" v="459" actId="1076"/>
           <ac:spMkLst>
             <pc:docMk/>
             <pc:sldMk cId="1142656066" sldId="256"/>
@@ -4299,10 +4304,10 @@
           </p:nvGrpSpPr>
           <p:grpSpPr>
             <a:xfrm>
-              <a:off x="1189022" y="1065121"/>
-              <a:ext cx="9186250" cy="4762010"/>
-              <a:chOff x="1524000" y="1434173"/>
-              <a:chExt cx="6843081" cy="3850976"/>
+              <a:off x="1189022" y="1065120"/>
+              <a:ext cx="9186250" cy="4762011"/>
+              <a:chOff x="1524000" y="1434172"/>
+              <a:chExt cx="6843081" cy="3850977"/>
             </a:xfrm>
           </p:grpSpPr>
           <p:sp>
@@ -4582,7 +4587,7 @@
             <p:spPr>
               <a:xfrm>
                 <a:off x="4631239" y="3859591"/>
-                <a:ext cx="605099" cy="261610"/>
+                <a:ext cx="605099" cy="211561"/>
               </a:xfrm>
               <a:prstGeom prst="rect">
                 <a:avLst/>
@@ -4596,15 +4601,15 @@
               <a:lstStyle/>
               <a:p>
                 <a:r>
-                  <a:rPr lang="en-CA" sz="1100" dirty="0"/>
+                  <a:rPr lang="en-CA" sz="1100" b="1" dirty="0"/>
                   <a:t>Robot</a:t>
                 </a:r>
-                <a:endParaRPr lang="en-CA" dirty="0"/>
+                <a:endParaRPr lang="en-CA" b="1" dirty="0"/>
               </a:p>
             </p:txBody>
           </p:sp>
-          <mc:AlternateContent xmlns:mc="http://schemas.openxmlformats.org/markup-compatibility/2006">
-            <mc:Choice xmlns:a14="http://schemas.microsoft.com/office/drawing/2010/main" Requires="a14">
+          <mc:AlternateContent xmlns:mc="http://schemas.openxmlformats.org/markup-compatibility/2006" xmlns:a14="http://schemas.microsoft.com/office/drawing/2010/main">
+            <mc:Choice Requires="a14">
               <p:sp>
                 <p:nvSpPr>
                   <p:cNvPr id="80" name="TextBox 79">
@@ -4633,6 +4638,7 @@
                   </a:bodyPr>
                   <a:lstStyle/>
                   <a:p>
+                    <a:pPr/>
                     <a14:m>
                       <m:oMathPara xmlns:m="http://schemas.openxmlformats.org/officeDocument/2006/math">
                         <m:oMathParaPr>
@@ -4689,7 +4695,7 @@
                 </p:txBody>
               </p:sp>
             </mc:Choice>
-            <mc:Fallback>
+            <mc:Fallback xmlns="">
               <p:sp>
                 <p:nvSpPr>
                   <p:cNvPr id="80" name="TextBox 79">
@@ -4874,7 +4880,7 @@
             </p:nvSpPr>
             <p:spPr>
               <a:xfrm>
-                <a:off x="7307959" y="1434173"/>
+                <a:off x="7275275" y="1434172"/>
                 <a:ext cx="881260" cy="211561"/>
               </a:xfrm>
               <a:prstGeom prst="rect">
@@ -4889,15 +4895,15 @@
               <a:lstStyle/>
               <a:p>
                 <a:r>
-                  <a:rPr lang="en-CA" sz="1100" dirty="0"/>
+                  <a:rPr lang="en-CA" sz="1100" b="1" dirty="0"/>
                   <a:t>Fiducial Marker</a:t>
                 </a:r>
-                <a:endParaRPr lang="en-CA" dirty="0"/>
+                <a:endParaRPr lang="en-CA" b="1" dirty="0"/>
               </a:p>
             </p:txBody>
           </p:sp>
-          <mc:AlternateContent xmlns:mc="http://schemas.openxmlformats.org/markup-compatibility/2006">
-            <mc:Choice xmlns:a14="http://schemas.microsoft.com/office/drawing/2010/main" Requires="a14">
+          <mc:AlternateContent xmlns:mc="http://schemas.openxmlformats.org/markup-compatibility/2006" xmlns:a14="http://schemas.microsoft.com/office/drawing/2010/main">
+            <mc:Choice Requires="a14">
               <p:sp>
                 <p:nvSpPr>
                   <p:cNvPr id="88" name="TextBox 87">
@@ -4926,6 +4932,7 @@
                   </a:bodyPr>
                   <a:lstStyle/>
                   <a:p>
+                    <a:pPr/>
                     <a14:m>
                       <m:oMathPara xmlns:m="http://schemas.openxmlformats.org/officeDocument/2006/math">
                         <m:oMathParaPr>
@@ -4982,7 +4989,7 @@
                 </p:txBody>
               </p:sp>
             </mc:Choice>
-            <mc:Fallback>
+            <mc:Fallback xmlns="">
               <p:sp>
                 <p:nvSpPr>
                   <p:cNvPr id="88" name="TextBox 87">
@@ -5027,8 +5034,8 @@
               </p:sp>
             </mc:Fallback>
           </mc:AlternateContent>
-          <mc:AlternateContent xmlns:mc="http://schemas.openxmlformats.org/markup-compatibility/2006">
-            <mc:Choice xmlns:a14="http://schemas.microsoft.com/office/drawing/2010/main" Requires="a14">
+          <mc:AlternateContent xmlns:mc="http://schemas.openxmlformats.org/markup-compatibility/2006" xmlns:a14="http://schemas.microsoft.com/office/drawing/2010/main">
+            <mc:Choice Requires="a14">
               <p:sp>
                 <p:nvSpPr>
                   <p:cNvPr id="89" name="TextBox 88">
@@ -5057,6 +5064,7 @@
                   </a:bodyPr>
                   <a:lstStyle/>
                   <a:p>
+                    <a:pPr/>
                     <a14:m>
                       <m:oMathPara xmlns:m="http://schemas.openxmlformats.org/officeDocument/2006/math">
                         <m:oMathParaPr>
@@ -5095,7 +5103,7 @@
                 </p:txBody>
               </p:sp>
             </mc:Choice>
-            <mc:Fallback>
+            <mc:Fallback xmlns="">
               <p:sp>
                 <p:nvSpPr>
                   <p:cNvPr id="89" name="TextBox 88">
@@ -5273,7 +5281,7 @@
                 <p:spPr>
                   <a:xfrm>
                     <a:off x="2608651" y="3502629"/>
-                    <a:ext cx="414537" cy="276999"/>
+                    <a:ext cx="331917" cy="224006"/>
                   </a:xfrm>
                   <a:prstGeom prst="rect">
                     <a:avLst/>
@@ -5286,6 +5294,7 @@
                   </a:bodyPr>
                   <a:lstStyle/>
                   <a:p>
+                    <a:pPr/>
                     <a14:m>
                       <m:oMathPara xmlns:m="http://schemas.openxmlformats.org/officeDocument/2006/math">
                         <m:oMathParaPr>
@@ -5295,32 +5304,32 @@
                           <m:sSub>
                             <m:sSubPr>
                               <m:ctrlPr>
-                                <a:rPr lang="en-CA" i="1" smtClean="0">
+                                <a:rPr lang="en-CA" b="1" i="1" smtClean="0">
                                   <a:latin typeface="Cambria Math" panose="02040503050406030204" pitchFamily="18" charset="0"/>
                                 </a:rPr>
                               </m:ctrlPr>
                             </m:sSubPr>
                             <m:e>
                               <m:r>
-                                <a:rPr lang="en-CA" b="0" i="1" smtClean="0">
+                                <a:rPr lang="en-CA" b="1" i="1" smtClean="0">
                                   <a:latin typeface="Cambria Math" panose="02040503050406030204" pitchFamily="18" charset="0"/>
                                 </a:rPr>
-                                <m:t>𝑇</m:t>
+                                <m:t>𝑻</m:t>
                               </m:r>
                             </m:e>
                             <m:sub>
                               <m:r>
-                                <a:rPr lang="en-CA" b="0" i="1" smtClean="0">
+                                <a:rPr lang="en-CA" b="1" i="1" smtClean="0">
                                   <a:latin typeface="Cambria Math" panose="02040503050406030204" pitchFamily="18" charset="0"/>
                                 </a:rPr>
-                                <m:t>𝑚𝑟</m:t>
+                                <m:t>𝒎𝒓</m:t>
                               </m:r>
                             </m:sub>
                           </m:sSub>
                         </m:oMath>
                       </m:oMathPara>
                     </a14:m>
-                    <a:endParaRPr lang="en-CA" dirty="0"/>
+                    <a:endParaRPr lang="en-CA" b="1" dirty="0"/>
                   </a:p>
                 </p:txBody>
               </p:sp>
@@ -5343,7 +5352,7 @@
                 <p:spPr>
                   <a:xfrm>
                     <a:off x="2608651" y="3502629"/>
-                    <a:ext cx="414537" cy="276999"/>
+                    <a:ext cx="331917" cy="224006"/>
                   </a:xfrm>
                   <a:prstGeom prst="rect">
                     <a:avLst/>
@@ -5351,7 +5360,7 @@
                   <a:blipFill>
                     <a:blip r:embed="rId5"/>
                     <a:stretch>
-                      <a:fillRect/>
+                      <a:fillRect l="-12329" r="-4110" b="-11111"/>
                     </a:stretch>
                   </a:blipFill>
                 </p:spPr>
@@ -5387,7 +5396,7 @@
                 <p:spPr>
                   <a:xfrm>
                     <a:off x="6063863" y="3807204"/>
-                    <a:ext cx="431657" cy="299249"/>
+                    <a:ext cx="335500" cy="245214"/>
                   </a:xfrm>
                   <a:prstGeom prst="rect">
                     <a:avLst/>
@@ -5400,6 +5409,7 @@
                   </a:bodyPr>
                   <a:lstStyle/>
                   <a:p>
+                    <a:pPr/>
                     <a14:m>
                       <m:oMathPara xmlns:m="http://schemas.openxmlformats.org/officeDocument/2006/math">
                         <m:oMathParaPr>
@@ -5409,32 +5419,32 @@
                           <m:sSub>
                             <m:sSubPr>
                               <m:ctrlPr>
-                                <a:rPr lang="en-CA" i="1" smtClean="0">
+                                <a:rPr lang="en-CA" b="1" i="1" smtClean="0">
                                   <a:latin typeface="Cambria Math" panose="02040503050406030204" pitchFamily="18" charset="0"/>
                                 </a:rPr>
                               </m:ctrlPr>
                             </m:sSubPr>
                             <m:e>
                               <m:r>
-                                <a:rPr lang="en-CA" b="0" i="1" smtClean="0">
+                                <a:rPr lang="en-CA" b="1" i="1" smtClean="0">
                                   <a:latin typeface="Cambria Math" panose="02040503050406030204" pitchFamily="18" charset="0"/>
                                 </a:rPr>
-                                <m:t>𝑇</m:t>
+                                <m:t>𝑻</m:t>
                               </m:r>
                             </m:e>
                             <m:sub>
                               <m:r>
-                                <a:rPr lang="en-CA" b="0" i="1" smtClean="0">
+                                <a:rPr lang="en-CA" b="1" i="1" smtClean="0">
                                   <a:latin typeface="Cambria Math" panose="02040503050406030204" pitchFamily="18" charset="0"/>
                                 </a:rPr>
-                                <m:t>𝑚𝑓</m:t>
+                                <m:t>𝒎𝒇</m:t>
                               </m:r>
                             </m:sub>
                           </m:sSub>
                         </m:oMath>
                       </m:oMathPara>
                     </a14:m>
-                    <a:endParaRPr lang="en-CA" dirty="0"/>
+                    <a:endParaRPr lang="en-CA" b="1" dirty="0"/>
                   </a:p>
                 </p:txBody>
               </p:sp>
@@ -5457,7 +5467,7 @@
                 <p:spPr>
                   <a:xfrm>
                     <a:off x="6063863" y="3807204"/>
-                    <a:ext cx="431657" cy="299249"/>
+                    <a:ext cx="335500" cy="245214"/>
                   </a:xfrm>
                   <a:prstGeom prst="rect">
                     <a:avLst/>
@@ -5465,7 +5475,7 @@
                   <a:blipFill>
                     <a:blip r:embed="rId6"/>
                     <a:stretch>
-                      <a:fillRect b="-5000"/>
+                      <a:fillRect l="-12162" r="-12162" b="-28571"/>
                     </a:stretch>
                   </a:blipFill>
                 </p:spPr>
@@ -5501,7 +5511,7 @@
                 <p:spPr>
                   <a:xfrm>
                     <a:off x="5070870" y="1835166"/>
-                    <a:ext cx="1199624" cy="321627"/>
+                    <a:ext cx="936046" cy="269481"/>
                   </a:xfrm>
                   <a:prstGeom prst="rect">
                     <a:avLst/>
@@ -5514,6 +5524,7 @@
                   </a:bodyPr>
                   <a:lstStyle/>
                   <a:p>
+                    <a:pPr/>
                     <a14:m>
                       <m:oMathPara xmlns:m="http://schemas.openxmlformats.org/officeDocument/2006/math">
                         <m:oMathParaPr>
@@ -5523,30 +5534,30 @@
                           <m:sSub>
                             <m:sSubPr>
                               <m:ctrlPr>
-                                <a:rPr lang="en-CA" i="1" smtClean="0">
+                                <a:rPr lang="en-CA" b="1" i="1" smtClean="0">
                                   <a:latin typeface="Cambria Math" panose="02040503050406030204" pitchFamily="18" charset="0"/>
                                 </a:rPr>
                               </m:ctrlPr>
                             </m:sSubPr>
                             <m:e>
                               <m:r>
-                                <a:rPr lang="en-CA" b="0" i="1" smtClean="0">
+                                <a:rPr lang="en-CA" b="1" i="1" smtClean="0">
                                   <a:latin typeface="Cambria Math" panose="02040503050406030204" pitchFamily="18" charset="0"/>
                                 </a:rPr>
-                                <m:t>𝑇</m:t>
+                                <m:t>𝑻</m:t>
                               </m:r>
                             </m:e>
                             <m:sub>
                               <m:r>
-                                <a:rPr lang="en-CA" b="0" i="1" smtClean="0">
+                                <a:rPr lang="en-CA" b="1" i="1" smtClean="0">
                                   <a:latin typeface="Cambria Math" panose="02040503050406030204" pitchFamily="18" charset="0"/>
                                 </a:rPr>
-                                <m:t>𝑟𝑓</m:t>
+                                <m:t>𝒓𝒇</m:t>
                               </m:r>
                             </m:sub>
                           </m:sSub>
                           <m:r>
-                            <a:rPr lang="en-CA" b="0" i="1" smtClean="0">
+                            <a:rPr lang="en-CA" b="1" i="1" smtClean="0">
                               <a:latin typeface="Cambria Math" panose="02040503050406030204" pitchFamily="18" charset="0"/>
                             </a:rPr>
                             <m:t>=</m:t>
@@ -5554,7 +5565,7 @@
                           <m:sSup>
                             <m:sSupPr>
                               <m:ctrlPr>
-                                <a:rPr lang="en-CA" b="0" i="1" smtClean="0">
+                                <a:rPr lang="en-CA" b="1" i="1" smtClean="0">
                                   <a:latin typeface="Cambria Math" panose="02040503050406030204" pitchFamily="18" charset="0"/>
                                 </a:rPr>
                               </m:ctrlPr>
@@ -5563,42 +5574,48 @@
                               <m:sSub>
                                 <m:sSubPr>
                                   <m:ctrlPr>
-                                    <a:rPr lang="en-CA" b="0" i="1" smtClean="0">
+                                    <a:rPr lang="en-CA" b="1" i="1" smtClean="0">
                                       <a:latin typeface="Cambria Math" panose="02040503050406030204" pitchFamily="18" charset="0"/>
                                     </a:rPr>
                                   </m:ctrlPr>
                                 </m:sSubPr>
                                 <m:e>
                                   <m:r>
-                                    <a:rPr lang="en-CA" b="0" i="1" smtClean="0">
+                                    <a:rPr lang="en-CA" b="1" i="1" smtClean="0">
                                       <a:latin typeface="Cambria Math" panose="02040503050406030204" pitchFamily="18" charset="0"/>
                                     </a:rPr>
-                                    <m:t>𝑇</m:t>
+                                    <m:t>𝑻</m:t>
                                   </m:r>
                                 </m:e>
                                 <m:sub>
                                   <m:r>
-                                    <a:rPr lang="en-CA" b="0" i="1" smtClean="0">
+                                    <a:rPr lang="en-CA" b="1" i="1" smtClean="0">
                                       <a:latin typeface="Cambria Math" panose="02040503050406030204" pitchFamily="18" charset="0"/>
                                     </a:rPr>
-                                    <m:t>𝑓𝑟</m:t>
+                                    <m:t>𝒇𝒓</m:t>
                                   </m:r>
                                 </m:sub>
                               </m:sSub>
                             </m:e>
                             <m:sup>
                               <m:r>
-                                <a:rPr lang="en-CA" b="0" i="1" smtClean="0">
+                                <a:rPr lang="en-CA" b="1" i="1" smtClean="0">
                                   <a:latin typeface="Cambria Math" panose="02040503050406030204" pitchFamily="18" charset="0"/>
                                 </a:rPr>
-                                <m:t>−1</m:t>
+                                <m:t>−</m:t>
+                              </m:r>
+                              <m:r>
+                                <a:rPr lang="en-CA" b="1" i="1" smtClean="0">
+                                  <a:latin typeface="Cambria Math" panose="02040503050406030204" pitchFamily="18" charset="0"/>
+                                </a:rPr>
+                                <m:t>𝟏</m:t>
                               </m:r>
                             </m:sup>
                           </m:sSup>
                         </m:oMath>
                       </m:oMathPara>
                     </a14:m>
-                    <a:endParaRPr lang="en-CA" dirty="0"/>
+                    <a:endParaRPr lang="en-CA" b="1" dirty="0"/>
                   </a:p>
                 </p:txBody>
               </p:sp>
@@ -5621,7 +5638,7 @@
                 <p:spPr>
                   <a:xfrm>
                     <a:off x="5070870" y="1835166"/>
-                    <a:ext cx="1199624" cy="321627"/>
+                    <a:ext cx="936046" cy="269481"/>
                   </a:xfrm>
                   <a:prstGeom prst="rect">
                     <a:avLst/>
@@ -5629,7 +5646,7 @@
                   <a:blipFill>
                     <a:blip r:embed="rId7"/>
                     <a:stretch>
-                      <a:fillRect t="-1538" b="-1538"/>
+                      <a:fillRect l="-4369" t="-1852" r="-2427" b="-25926"/>
                     </a:stretch>
                   </a:blipFill>
                 </p:spPr>

</xml_diff>